<commit_message>
Add boost/thrust references on ppt
</commit_message>
<xml_diff>
--- a/Results/Fast Minimum Spanning Tree for Large Graphs on.pptx
+++ b/Results/Fast Minimum Spanning Tree for Large Graphs on.pptx
@@ -11,7 +11,8 @@
     <p:sldId id="261" r:id="rId5"/>
     <p:sldId id="259" r:id="rId6"/>
     <p:sldId id="260" r:id="rId7"/>
-    <p:sldId id="262" r:id="rId8"/>
+    <p:sldId id="263" r:id="rId8"/>
+    <p:sldId id="262" r:id="rId9"/>
   </p:sldIdLst>
   <p:sldSz cx="12192000" cy="6858000"/>
   <p:notesSz cx="6858000" cy="9144000"/>
@@ -110,6 +111,11 @@
       </a:defRPr>
     </a:lvl9pPr>
   </p:defaultTextStyle>
+  <p:extLst>
+    <p:ext uri="{EFAFB233-063F-42B5-8137-9DF3F51BA10A}">
+      <p15:sldGuideLst xmlns:p15="http://schemas.microsoft.com/office/powerpoint/2012/main"/>
+    </p:ext>
+  </p:extLst>
 </p:presentation>
 </file>
 
@@ -6682,6 +6688,113 @@
           </a:p>
         </p:txBody>
       </p:sp>
+      <p:pic>
+        <p:nvPicPr>
+          <p:cNvPr id="5" name="Immagine 4">
+            <a:extLst>
+              <a:ext uri="{FF2B5EF4-FFF2-40B4-BE49-F238E27FC236}">
+                <a16:creationId xmlns:a16="http://schemas.microsoft.com/office/drawing/2014/main" id="{BF85822C-5F3B-4194-B5FA-F737ADD77EAF}"/>
+              </a:ext>
+            </a:extLst>
+          </p:cNvPr>
+          <p:cNvPicPr>
+            <a:picLocks noChangeAspect="1"/>
+          </p:cNvPicPr>
+          <p:nvPr/>
+        </p:nvPicPr>
+        <p:blipFill>
+          <a:blip r:embed="rId3">
+            <a:extLst>
+              <a:ext uri="{28A0092B-C50C-407E-A947-70E740481C1C}">
+                <a14:useLocalDpi xmlns:a14="http://schemas.microsoft.com/office/drawing/2010/main" val="0"/>
+              </a:ext>
+            </a:extLst>
+          </a:blip>
+          <a:stretch>
+            <a:fillRect/>
+          </a:stretch>
+        </p:blipFill>
+        <p:spPr>
+          <a:xfrm>
+            <a:off x="4563190" y="4649356"/>
+            <a:ext cx="45719" cy="45719"/>
+          </a:xfrm>
+          <a:prstGeom prst="rect">
+            <a:avLst/>
+          </a:prstGeom>
+        </p:spPr>
+      </p:pic>
+      <p:pic>
+        <p:nvPicPr>
+          <p:cNvPr id="7" name="Immagine 6" descr="Immagine che contiene clipart&#10;&#10;Descrizione generata automaticamente">
+            <a:extLst>
+              <a:ext uri="{FF2B5EF4-FFF2-40B4-BE49-F238E27FC236}">
+                <a16:creationId xmlns:a16="http://schemas.microsoft.com/office/drawing/2014/main" id="{A5A65B51-D83A-4DC9-A65C-4742B5446979}"/>
+              </a:ext>
+            </a:extLst>
+          </p:cNvPr>
+          <p:cNvPicPr>
+            <a:picLocks noChangeAspect="1"/>
+          </p:cNvPicPr>
+          <p:nvPr/>
+        </p:nvPicPr>
+        <p:blipFill>
+          <a:blip r:embed="rId4">
+            <a:extLst>
+              <a:ext uri="{28A0092B-C50C-407E-A947-70E740481C1C}">
+                <a14:useLocalDpi xmlns:a14="http://schemas.microsoft.com/office/drawing/2010/main" val="0"/>
+              </a:ext>
+            </a:extLst>
+          </a:blip>
+          <a:stretch>
+            <a:fillRect/>
+          </a:stretch>
+        </p:blipFill>
+        <p:spPr>
+          <a:xfrm>
+            <a:off x="838200" y="3276418"/>
+            <a:ext cx="4402350" cy="1738928"/>
+          </a:xfrm>
+          <a:prstGeom prst="rect">
+            <a:avLst/>
+          </a:prstGeom>
+        </p:spPr>
+      </p:pic>
+      <p:pic>
+        <p:nvPicPr>
+          <p:cNvPr id="9" name="Immagine 8">
+            <a:extLst>
+              <a:ext uri="{FF2B5EF4-FFF2-40B4-BE49-F238E27FC236}">
+                <a16:creationId xmlns:a16="http://schemas.microsoft.com/office/drawing/2014/main" id="{EA958925-B633-4193-84F5-97A2B1E6AA9E}"/>
+              </a:ext>
+            </a:extLst>
+          </p:cNvPr>
+          <p:cNvPicPr>
+            <a:picLocks noChangeAspect="1"/>
+          </p:cNvPicPr>
+          <p:nvPr/>
+        </p:nvPicPr>
+        <p:blipFill rotWithShape="1">
+          <a:blip r:embed="rId5">
+            <a:extLst>
+              <a:ext uri="{28A0092B-C50C-407E-A947-70E740481C1C}">
+                <a14:useLocalDpi xmlns:a14="http://schemas.microsoft.com/office/drawing/2010/main" val="0"/>
+              </a:ext>
+            </a:extLst>
+          </a:blip>
+          <a:srcRect t="15957" b="24254"/>
+          <a:stretch/>
+        </p:blipFill>
+        <p:spPr>
+          <a:xfrm>
+            <a:off x="5957454" y="2736020"/>
+            <a:ext cx="3950277" cy="2530548"/>
+          </a:xfrm>
+          <a:prstGeom prst="rect">
+            <a:avLst/>
+          </a:prstGeom>
+        </p:spPr>
+      </p:pic>
     </p:spTree>
     <p:extLst>
       <p:ext uri="{BB962C8B-B14F-4D97-AF65-F5344CB8AC3E}">
@@ -6945,6 +7058,105 @@
 </file>
 
 <file path=ppt/slides/slide7.xml><?xml version="1.0" encoding="utf-8"?>
+<p:sld xmlns:a="http://schemas.openxmlformats.org/drawingml/2006/main" xmlns:r="http://schemas.openxmlformats.org/officeDocument/2006/relationships" xmlns:p="http://schemas.openxmlformats.org/presentationml/2006/main">
+  <p:cSld>
+    <p:spTree>
+      <p:nvGrpSpPr>
+        <p:cNvPr id="1" name=""/>
+        <p:cNvGrpSpPr/>
+        <p:nvPr/>
+      </p:nvGrpSpPr>
+      <p:grpSpPr>
+        <a:xfrm>
+          <a:off x="0" y="0"/>
+          <a:ext cx="0" cy="0"/>
+          <a:chOff x="0" y="0"/>
+          <a:chExt cx="0" cy="0"/>
+        </a:xfrm>
+      </p:grpSpPr>
+      <p:sp>
+        <p:nvSpPr>
+          <p:cNvPr id="2" name="Titolo 1">
+            <a:extLst>
+              <a:ext uri="{FF2B5EF4-FFF2-40B4-BE49-F238E27FC236}">
+                <a16:creationId xmlns:a16="http://schemas.microsoft.com/office/drawing/2014/main" id="{237E4083-B536-42CA-AF5C-887765C251CF}"/>
+              </a:ext>
+            </a:extLst>
+          </p:cNvPr>
+          <p:cNvSpPr>
+            <a:spLocks noGrp="1"/>
+          </p:cNvSpPr>
+          <p:nvPr>
+            <p:ph type="title"/>
+          </p:nvPr>
+        </p:nvSpPr>
+        <p:spPr/>
+        <p:txBody>
+          <a:bodyPr/>
+          <a:lstStyle/>
+          <a:p>
+            <a:r>
+              <a:rPr lang="it-IT" dirty="0"/>
+              <a:t>How to validate </a:t>
+            </a:r>
+            <a:r>
+              <a:rPr lang="it-IT" dirty="0" err="1"/>
+              <a:t>correctness</a:t>
+            </a:r>
+            <a:endParaRPr lang="it-IT" dirty="0"/>
+          </a:p>
+        </p:txBody>
+      </p:sp>
+      <p:pic>
+        <p:nvPicPr>
+          <p:cNvPr id="6" name="Immagine 5" descr="Immagine che contiene screenshot&#10;&#10;Descrizione generata automaticamente">
+            <a:extLst>
+              <a:ext uri="{FF2B5EF4-FFF2-40B4-BE49-F238E27FC236}">
+                <a16:creationId xmlns:a16="http://schemas.microsoft.com/office/drawing/2014/main" id="{C6EC3297-886F-457D-BA50-406C47E4CE2A}"/>
+              </a:ext>
+            </a:extLst>
+          </p:cNvPr>
+          <p:cNvPicPr>
+            <a:picLocks noChangeAspect="1"/>
+          </p:cNvPicPr>
+          <p:nvPr/>
+        </p:nvPicPr>
+        <p:blipFill>
+          <a:blip r:embed="rId2">
+            <a:extLst>
+              <a:ext uri="{28A0092B-C50C-407E-A947-70E740481C1C}">
+                <a14:useLocalDpi xmlns:a14="http://schemas.microsoft.com/office/drawing/2010/main" val="0"/>
+              </a:ext>
+            </a:extLst>
+          </a:blip>
+          <a:stretch>
+            <a:fillRect/>
+          </a:stretch>
+        </p:blipFill>
+        <p:spPr>
+          <a:xfrm>
+            <a:off x="1266606" y="1987564"/>
+            <a:ext cx="9326277" cy="1857634"/>
+          </a:xfrm>
+          <a:prstGeom prst="rect">
+            <a:avLst/>
+          </a:prstGeom>
+        </p:spPr>
+      </p:pic>
+    </p:spTree>
+    <p:extLst>
+      <p:ext uri="{BB962C8B-B14F-4D97-AF65-F5344CB8AC3E}">
+        <p14:creationId xmlns:p14="http://schemas.microsoft.com/office/powerpoint/2010/main" val="2049367518"/>
+      </p:ext>
+    </p:extLst>
+  </p:cSld>
+  <p:clrMapOvr>
+    <a:masterClrMapping/>
+  </p:clrMapOvr>
+</p:sld>
+</file>
+
+<file path=ppt/slides/slide8.xml><?xml version="1.0" encoding="utf-8"?>
 <p:sld xmlns:a="http://schemas.openxmlformats.org/drawingml/2006/main" xmlns:r="http://schemas.openxmlformats.org/officeDocument/2006/relationships" xmlns:p="http://schemas.openxmlformats.org/presentationml/2006/main">
   <p:cSld>
     <p:spTree>

</xml_diff>